<commit_message>
Refine visuals and slides per review feedback
</commit_message>
<xml_diff>
--- a/workspace/presentations/eda-lstm-vwc-prediction.pptx
+++ b/workspace/presentations/eda-lstm-vwc-prediction.pptx
@@ -4239,7 +4239,7 @@
                 <a:ea typeface="Arial" pitchFamily="34" charset="-122"/>
                 <a:cs typeface="Arial" pitchFamily="34" charset="-120"/>
               </a:rPr>
-              <a:t>Daily averages for plot 2003 after interpolation. Because we currently fill every day, irrigation spikes get softened—masking wet days before PCHIP would preserve those jumps.</a:t>
+              <a:t>Daily averages for plot 2014 after interpolation. Because we currently fill every day, irrigation spikes get softened—masking wet days before PCHIP would preserve those jumps.</a:t>
             </a:r>
             <a:endParaRPr lang="en-US" sz="1350" dirty="0"/>
           </a:p>
@@ -4281,7 +4281,7 @@
       </p:sp>
       <p:pic>
         <p:nvPicPr>
-          <p:cNvPr id="6" name="Image 0" descr="/home/bryan/presentation/slide-maker/workspace/images/eda_assets/plot2003_daily_mean_and_interpolated_vwc_all_depths.png">    </p:cNvPr>
+          <p:cNvPr id="6" name="Image 0" descr="/home/bryan/presentation/slide-maker/workspace/images/eda_assets/plot2014_daily_mean_and_interpolated_vwc_all_depths.png">    </p:cNvPr>
           <p:cNvPicPr>
             <a:picLocks noChangeAspect="1"/>
           </p:cNvPicPr>
@@ -4752,7 +4752,7 @@
                 <a:ea typeface="Arial" pitchFamily="34" charset="-122"/>
                 <a:cs typeface="Arial" pitchFamily="34" charset="-120"/>
               </a:rPr>
-              <a:t>Smoothed curves (solid) follow the interpolated series (dotted) while stripping sensor chatter. These become the basis for derivative features.</a:t>
+              <a:t>Smoothed curves (solid) for plot 2014 follow the interpolated series (dotted) while stripping sensor chatter. These become the basis for derivative features.</a:t>
             </a:r>
             <a:endParaRPr lang="en-US" sz="1350" dirty="0"/>
           </a:p>
@@ -4794,7 +4794,7 @@
       </p:sp>
       <p:pic>
         <p:nvPicPr>
-          <p:cNvPr id="6" name="Image 0" descr="/home/bryan/presentation/slide-maker/workspace/images/eda_assets/plot2003_savgol_smoothed_vwc_vs_interpolated.png">    </p:cNvPr>
+          <p:cNvPr id="6" name="Image 0" descr="/home/bryan/presentation/slide-maker/workspace/images/eda_assets/plot2014_savgol_smoothed_vwc_vs_interpolated.png">    </p:cNvPr>
           <p:cNvPicPr>
             <a:picLocks noChangeAspect="1"/>
           </p:cNvPicPr>
@@ -4995,7 +4995,7 @@
       </p:sp>
       <p:pic>
         <p:nvPicPr>
-          <p:cNvPr id="6" name="Image 0" descr="/home/bryan/presentation/slide-maker/workspace/images/eda_assets/plot2003_derivative_of_smoothed_vwc_all_depths.png">    </p:cNvPr>
+          <p:cNvPr id="6" name="Image 0" descr="/home/bryan/presentation/slide-maker/workspace/images/eda_assets/plot2014_derivative_of_smoothed_vwc_all_depths.png">    </p:cNvPr>
           <p:cNvPicPr>
             <a:picLocks noChangeAspect="1"/>
           </p:cNvPicPr>
@@ -5532,8 +5532,8 @@
         </p:nvSpPr>
         <p:spPr>
           <a:xfrm>
-            <a:off x="933599" y="1524000"/>
-            <a:ext cx="2323951" cy="1477268"/>
+            <a:off x="698450" y="1396901"/>
+            <a:ext cx="2514451" cy="2568476"/>
           </a:xfrm>
           <a:prstGeom prst="rect">
             <a:avLst/>
@@ -5574,8 +5574,8 @@
         </p:blipFill>
         <p:spPr>
           <a:xfrm>
-            <a:off x="1206550" y="1670000"/>
-            <a:ext cx="1777901" cy="1185267"/>
+            <a:off x="844451" y="1542901"/>
+            <a:ext cx="2222450" cy="1481584"/>
           </a:xfrm>
           <a:prstGeom prst="rect">
             <a:avLst/>
@@ -5590,8 +5590,50 @@
         </p:nvSpPr>
         <p:spPr>
           <a:xfrm>
-            <a:off x="3409950" y="1524000"/>
-            <a:ext cx="2323951" cy="1477268"/>
+            <a:off x="822226" y="3125986"/>
+            <a:ext cx="2266899" cy="462260"/>
+          </a:xfrm>
+          <a:prstGeom prst="rect">
+            <a:avLst/>
+          </a:prstGeom>
+          <a:noFill/>
+          <a:ln/>
+        </p:spPr>
+        <p:txBody>
+          <a:bodyPr wrap="square" lIns="0" tIns="0" rIns="0" bIns="0" rtlCol="0" anchor="t"/>
+          <a:lstStyle/>
+          <a:p>
+            <a:pPr algn="ctr" indent="0" marL="0">
+              <a:lnSpc>
+                <a:spcPts val="1820"/>
+              </a:lnSpc>
+              <a:buNone/>
+            </a:pPr>
+            <a:r>
+              <a:rPr lang="en-US" sz="1400" dirty="0">
+                <a:solidFill>
+                  <a:srgbClr val="433024"/>
+                </a:solidFill>
+                <a:latin typeface="Arial" pitchFamily="34" charset="0"/>
+                <a:ea typeface="Arial" pitchFamily="34" charset="-122"/>
+                <a:cs typeface="Arial" pitchFamily="34" charset="-120"/>
+              </a:rPr>
+              <a:t>Depth 6 cm reacts almost immediately after irrigation.</a:t>
+            </a:r>
+            <a:endParaRPr lang="en-US" sz="1400" dirty="0"/>
+          </a:p>
+        </p:txBody>
+      </p:sp>
+      <p:sp>
+        <p:nvSpPr>
+          <p:cNvPr id="7" name="Text 4"/>
+          <p:cNvSpPr/>
+          <p:nvPr/>
+        </p:nvSpPr>
+        <p:spPr>
+          <a:xfrm>
+            <a:off x="3339852" y="1396901"/>
+            <a:ext cx="2514451" cy="2568476"/>
           </a:xfrm>
           <a:prstGeom prst="rect">
             <a:avLst/>
@@ -5618,7 +5660,7 @@
       </p:sp>
       <p:pic>
         <p:nvPicPr>
-          <p:cNvPr id="7" name="Image 1" descr="/home/bryan/presentation/slide-maker/workspace/images/eda_assets/plot2014_depth18_spike_detection_flags.png">    </p:cNvPr>
+          <p:cNvPr id="8" name="Image 1" descr="/home/bryan/presentation/slide-maker/workspace/images/eda_assets/plot2014_depth18_spike_detection_flags.png">    </p:cNvPr>
           <p:cNvPicPr>
             <a:picLocks noChangeAspect="1"/>
           </p:cNvPicPr>
@@ -5632,8 +5674,8 @@
         </p:blipFill>
         <p:spPr>
           <a:xfrm>
-            <a:off x="3682901" y="1670000"/>
-            <a:ext cx="1777901" cy="1185267"/>
+            <a:off x="3485852" y="1542901"/>
+            <a:ext cx="2222450" cy="1481584"/>
           </a:xfrm>
           <a:prstGeom prst="rect">
             <a:avLst/>
@@ -5642,14 +5684,56 @@
       </p:pic>
       <p:sp>
         <p:nvSpPr>
-          <p:cNvPr id="8" name="Text 4"/>
-          <p:cNvSpPr/>
-          <p:nvPr/>
-        </p:nvSpPr>
-        <p:spPr>
-          <a:xfrm>
-            <a:off x="5886301" y="1524000"/>
-            <a:ext cx="2323951" cy="1477268"/>
+          <p:cNvPr id="9" name="Text 5"/>
+          <p:cNvSpPr/>
+          <p:nvPr/>
+        </p:nvSpPr>
+        <p:spPr>
+          <a:xfrm>
+            <a:off x="3463628" y="3125986"/>
+            <a:ext cx="2266899" cy="462260"/>
+          </a:xfrm>
+          <a:prstGeom prst="rect">
+            <a:avLst/>
+          </a:prstGeom>
+          <a:noFill/>
+          <a:ln/>
+        </p:spPr>
+        <p:txBody>
+          <a:bodyPr wrap="square" lIns="0" tIns="0" rIns="0" bIns="0" rtlCol="0" anchor="t"/>
+          <a:lstStyle/>
+          <a:p>
+            <a:pPr algn="ctr" indent="0" marL="0">
+              <a:lnSpc>
+                <a:spcPts val="1820"/>
+              </a:lnSpc>
+              <a:buNone/>
+            </a:pPr>
+            <a:r>
+              <a:rPr lang="en-US" sz="1400" dirty="0">
+                <a:solidFill>
+                  <a:srgbClr val="433024"/>
+                </a:solidFill>
+                <a:latin typeface="Arial" pitchFamily="34" charset="0"/>
+                <a:ea typeface="Arial" pitchFamily="34" charset="-122"/>
+                <a:cs typeface="Arial" pitchFamily="34" charset="-120"/>
+              </a:rPr>
+              <a:t>Depth 18 cm lags by a day but still shows a clear spike.</a:t>
+            </a:r>
+            <a:endParaRPr lang="en-US" sz="1400" dirty="0"/>
+          </a:p>
+        </p:txBody>
+      </p:sp>
+      <p:sp>
+        <p:nvSpPr>
+          <p:cNvPr id="10" name="Text 6"/>
+          <p:cNvSpPr/>
+          <p:nvPr/>
+        </p:nvSpPr>
+        <p:spPr>
+          <a:xfrm>
+            <a:off x="5981254" y="1396901"/>
+            <a:ext cx="2514451" cy="2568476"/>
           </a:xfrm>
           <a:prstGeom prst="rect">
             <a:avLst/>
@@ -5676,7 +5760,7 @@
       </p:sp>
       <p:pic>
         <p:nvPicPr>
-          <p:cNvPr id="9" name="Image 2" descr="/home/bryan/presentation/slide-maker/workspace/images/eda_assets/plot2014_depth30_spike_detection_flags.png">    </p:cNvPr>
+          <p:cNvPr id="11" name="Image 2" descr="/home/bryan/presentation/slide-maker/workspace/images/eda_assets/plot2014_depth30_spike_detection_flags.png">    </p:cNvPr>
           <p:cNvPicPr>
             <a:picLocks noChangeAspect="1"/>
           </p:cNvPicPr>
@@ -5690,8 +5774,8 @@
         </p:blipFill>
         <p:spPr>
           <a:xfrm>
-            <a:off x="6159252" y="1670000"/>
-            <a:ext cx="1777901" cy="1185267"/>
+            <a:off x="6127254" y="1542901"/>
+            <a:ext cx="2222450" cy="1481584"/>
           </a:xfrm>
           <a:prstGeom prst="rect">
             <a:avLst/>
@@ -5700,14 +5784,14 @@
       </p:pic>
       <p:sp>
         <p:nvSpPr>
-          <p:cNvPr id="10" name="Text 5"/>
-          <p:cNvSpPr/>
-          <p:nvPr/>
-        </p:nvSpPr>
-        <p:spPr>
-          <a:xfrm>
-            <a:off x="556159" y="3204418"/>
-            <a:ext cx="8031682" cy="480120"/>
+          <p:cNvPr id="12" name="Text 7"/>
+          <p:cNvSpPr/>
+          <p:nvPr/>
+        </p:nvSpPr>
+        <p:spPr>
+          <a:xfrm>
+            <a:off x="6105029" y="3125986"/>
+            <a:ext cx="2266899" cy="693390"/>
           </a:xfrm>
           <a:prstGeom prst="rect">
             <a:avLst/>
@@ -5721,7 +5805,7 @@
           <a:p>
             <a:pPr algn="ctr" indent="0" marL="0">
               <a:lnSpc>
-                <a:spcPts val="1890"/>
+                <a:spcPts val="1820"/>
               </a:lnSpc>
               <a:buNone/>
             </a:pPr>
@@ -5734,9 +5818,51 @@
                 <a:ea typeface="Arial" pitchFamily="34" charset="-122"/>
                 <a:cs typeface="Arial" pitchFamily="34" charset="-120"/>
               </a:rPr>
-              <a:t>Each depth responds differently. The binary flags align with the ΔVWC spikes we saw earlier, giving the model a crisp indicator of irrigation timing.</a:t>
+              <a:t>Depth 30 cm keeps the irrigation signal even though it is dampened.</a:t>
             </a:r>
             <a:endParaRPr lang="en-US" sz="1400" dirty="0"/>
+          </a:p>
+        </p:txBody>
+      </p:sp>
+      <p:sp>
+        <p:nvSpPr>
+          <p:cNvPr id="13" name="Text 8"/>
+          <p:cNvSpPr/>
+          <p:nvPr/>
+        </p:nvSpPr>
+        <p:spPr>
+          <a:xfrm>
+            <a:off x="620478" y="4117777"/>
+            <a:ext cx="7953199" cy="445591"/>
+          </a:xfrm>
+          <a:prstGeom prst="rect">
+            <a:avLst/>
+          </a:prstGeom>
+          <a:noFill/>
+          <a:ln/>
+        </p:spPr>
+        <p:txBody>
+          <a:bodyPr wrap="square" lIns="0" tIns="0" rIns="0" bIns="0" rtlCol="0" anchor="t"/>
+          <a:lstStyle/>
+          <a:p>
+            <a:pPr algn="ctr" indent="0" marL="0">
+              <a:lnSpc>
+                <a:spcPts val="1755"/>
+              </a:lnSpc>
+              <a:buNone/>
+            </a:pPr>
+            <a:r>
+              <a:rPr lang="en-US" sz="1350" dirty="0">
+                <a:solidFill>
+                  <a:srgbClr val="433024"/>
+                </a:solidFill>
+                <a:latin typeface="Arial" pitchFamily="34" charset="0"/>
+                <a:ea typeface="Arial" pitchFamily="34" charset="-122"/>
+                <a:cs typeface="Arial" pitchFamily="34" charset="-120"/>
+              </a:rPr>
+              <a:t>These binary flags line up with the ΔVWC spikes we engineered earlier, giving the model a crisp indicator of irrigation timing at each depth.</a:t>
+            </a:r>
+            <a:endParaRPr lang="en-US" sz="1350" dirty="0"/>
           </a:p>
         </p:txBody>
       </p:sp>
@@ -6781,8 +6907,8 @@
         </p:nvSpPr>
         <p:spPr>
           <a:xfrm>
-            <a:off x="685800" y="1460450"/>
-            <a:ext cx="7772400" cy="480120"/>
+            <a:off x="685800" y="1396901"/>
+            <a:ext cx="7772400" cy="445591"/>
           </a:xfrm>
           <a:prstGeom prst="rect">
             <a:avLst/>
@@ -6796,12 +6922,12 @@
           <a:p>
             <a:pPr algn="ctr" indent="0" marL="0">
               <a:lnSpc>
-                <a:spcPts val="1890"/>
+                <a:spcPts val="1755"/>
               </a:lnSpc>
               <a:buNone/>
             </a:pPr>
             <a:r>
-              <a:rPr lang="en-US" sz="1400" dirty="0">
+              <a:rPr lang="en-US" sz="1350" dirty="0">
                 <a:solidFill>
                   <a:srgbClr val="433024"/>
                 </a:solidFill>
@@ -6811,7 +6937,7 @@
               </a:rPr>
               <a:t>Buffered MinMax scaling keeps the transformed precipitation signals inside [0,1] even when unseen storms arrive.</a:t>
             </a:r>
-            <a:endParaRPr lang="en-US" sz="1400" dirty="0"/>
+            <a:endParaRPr lang="en-US" sz="1350" dirty="0"/>
           </a:p>
         </p:txBody>
       </p:sp>
@@ -6823,8 +6949,8 @@
         </p:nvSpPr>
         <p:spPr>
           <a:xfrm>
-            <a:off x="590550" y="2118271"/>
-            <a:ext cx="7962900" cy="2628900"/>
+            <a:off x="590550" y="1994892"/>
+            <a:ext cx="7962900" cy="3136702"/>
           </a:xfrm>
           <a:prstGeom prst="rect">
             <a:avLst/>
@@ -6865,8 +6991,8 @@
         </p:blipFill>
         <p:spPr>
           <a:xfrm>
-            <a:off x="3200400" y="2289721"/>
-            <a:ext cx="2743200" cy="2286000"/>
+            <a:off x="2895600" y="2166342"/>
+            <a:ext cx="3352651" cy="2793802"/>
           </a:xfrm>
           <a:prstGeom prst="rect">
             <a:avLst/>
@@ -9318,8 +9444,8 @@
         </p:nvSpPr>
         <p:spPr>
           <a:xfrm>
-            <a:off x="762000" y="1524000"/>
-            <a:ext cx="7772400" cy="883593"/>
+            <a:off x="698450" y="1333500"/>
+            <a:ext cx="4443475" cy="1241971"/>
           </a:xfrm>
           <a:prstGeom prst="rect">
             <a:avLst/>
@@ -9333,12 +9459,12 @@
           <a:p>
             <a:pPr algn="l" indent="0" marL="0">
               <a:lnSpc>
-                <a:spcPts val="2320"/>
+                <a:spcPts val="1958"/>
               </a:lnSpc>
               <a:buNone/>
             </a:pPr>
             <a:r>
-              <a:rPr lang="en-US" sz="1600" dirty="0">
+              <a:rPr lang="en-US" sz="1450" dirty="0">
                 <a:solidFill>
                   <a:srgbClr val="433024"/>
                 </a:solidFill>
@@ -9346,9 +9472,9 @@
                 <a:ea typeface="Arial" pitchFamily="34" charset="-122"/>
                 <a:cs typeface="Arial" pitchFamily="34" charset="-120"/>
               </a:rPr>
-              <a:t>Cables get chewed, solar panels get cloudy, and irrigation events knock radios offline. In the raw export the notebook loads, these outages show up as NaNs sprinkled across every channel.</a:t>
-            </a:r>
-            <a:endParaRPr lang="en-US" sz="1600" dirty="0"/>
+              <a:t>Cables get chewed, solar panels cloud over, and irrigation knocks radios offline. In the raw export these outages show up as NaNs sprinkled across every channel. The next slide shows the best and worst raw VWC traces before cleaning.</a:t>
+            </a:r>
+            <a:endParaRPr lang="en-US" sz="1450" dirty="0"/>
           </a:p>
         </p:txBody>
       </p:sp>
@@ -9360,8 +9486,8 @@
         </p:nvSpPr>
         <p:spPr>
           <a:xfrm>
-            <a:off x="762000" y="2610743"/>
-            <a:ext cx="7772400" cy="295275"/>
+            <a:off x="698450" y="2676971"/>
+            <a:ext cx="4443475" cy="590550"/>
           </a:xfrm>
           <a:prstGeom prst="rect">
             <a:avLst/>
@@ -9399,102 +9525,8 @@
         </p:nvSpPr>
         <p:spPr>
           <a:xfrm>
-            <a:off x="762000" y="3109168"/>
-            <a:ext cx="7620000" cy="1003102"/>
-          </a:xfrm>
-          <a:prstGeom prst="rect">
-            <a:avLst/>
-          </a:prstGeom>
-          <a:noFill/>
-          <a:ln/>
-        </p:spPr>
-        <p:txBody>
-          <a:bodyPr wrap="square" lIns="139700" tIns="0" rIns="0" bIns="0" rtlCol="0" anchor="t"/>
-          <a:lstStyle/>
-          <a:p>
-            <a:pPr algn="l" marL="139700" indent="-139700">
-              <a:lnSpc>
-                <a:spcPts val="2100"/>
-              </a:lnSpc>
-              <a:spcAft>
-                <a:spcPts val="400"/>
-              </a:spcAft>
-              <a:buSzPct val="100000"/>
-              <a:buChar char="•"/>
-            </a:pPr>
-            <a:r>
-              <a:rPr lang="en-US" sz="1500" dirty="0">
-                <a:solidFill>
-                  <a:srgbClr val="433024"/>
-                </a:solidFill>
-                <a:latin typeface="Arial" pitchFamily="34" charset="0"/>
-                <a:ea typeface="Arial" pitchFamily="34" charset="-122"/>
-                <a:cs typeface="Arial" pitchFamily="34" charset="-120"/>
-              </a:rPr>
-              <a:t>Soil probes can go dark for days while the weather tower keeps logging.</a:t>
-            </a:r>
-            <a:endParaRPr lang="en-US" sz="1500" dirty="0"/>
-          </a:p>
-          <a:p>
-            <a:pPr algn="l" marL="139700" indent="-139700">
-              <a:lnSpc>
-                <a:spcPts val="2100"/>
-              </a:lnSpc>
-              <a:spcAft>
-                <a:spcPts val="400"/>
-              </a:spcAft>
-              <a:buSzPct val="100000"/>
-              <a:buChar char="•"/>
-            </a:pPr>
-            <a:r>
-              <a:rPr lang="en-US" sz="1500" dirty="0">
-                <a:solidFill>
-                  <a:srgbClr val="433024"/>
-                </a:solidFill>
-                <a:latin typeface="Arial" pitchFamily="34" charset="0"/>
-                <a:ea typeface="Arial" pitchFamily="34" charset="-122"/>
-                <a:cs typeface="Arial" pitchFamily="34" charset="-120"/>
-              </a:rPr>
-              <a:t>Power loss knocks out every channel, which is why we trim the dataset ends in code.</a:t>
-            </a:r>
-            <a:endParaRPr lang="en-US" sz="1500" dirty="0"/>
-          </a:p>
-          <a:p>
-            <a:pPr algn="l" marL="139700" indent="-139700">
-              <a:lnSpc>
-                <a:spcPts val="2100"/>
-              </a:lnSpc>
-              <a:spcAft>
-                <a:spcPts val="400"/>
-              </a:spcAft>
-              <a:buSzPct val="100000"/>
-              <a:buChar char="•"/>
-            </a:pPr>
-            <a:r>
-              <a:rPr lang="en-US" sz="1500" dirty="0">
-                <a:solidFill>
-                  <a:srgbClr val="433024"/>
-                </a:solidFill>
-                <a:latin typeface="Arial" pitchFamily="34" charset="0"/>
-                <a:ea typeface="Arial" pitchFamily="34" charset="-122"/>
-                <a:cs typeface="Arial" pitchFamily="34" charset="-120"/>
-              </a:rPr>
-              <a:t>Each plot recovers on its own schedule, so we avoid borrowing from neighbours.</a:t>
-            </a:r>
-            <a:endParaRPr lang="en-US" sz="1500" dirty="0"/>
-          </a:p>
-        </p:txBody>
-      </p:sp>
-      <p:sp>
-        <p:nvSpPr>
-          <p:cNvPr id="7" name="Text 5"/>
-          <p:cNvSpPr/>
-          <p:nvPr/>
-        </p:nvSpPr>
-        <p:spPr>
-          <a:xfrm>
-            <a:off x="762000" y="4315420"/>
-            <a:ext cx="7772400" cy="294531"/>
+            <a:off x="698450" y="3369022"/>
+            <a:ext cx="4443475" cy="1241971"/>
           </a:xfrm>
           <a:prstGeom prst="rect">
             <a:avLst/>
@@ -9508,12 +9540,12 @@
           <a:p>
             <a:pPr algn="l" indent="0" marL="0">
               <a:lnSpc>
-                <a:spcPts val="2320"/>
+                <a:spcPts val="1958"/>
               </a:lnSpc>
               <a:buNone/>
             </a:pPr>
             <a:r>
-              <a:rPr lang="en-US" sz="1600" dirty="0">
+              <a:rPr lang="en-US" sz="1450" dirty="0">
                 <a:solidFill>
                   <a:srgbClr val="433024"/>
                 </a:solidFill>
@@ -9521,12 +9553,70 @@
                 <a:ea typeface="Arial" pitchFamily="34" charset="-122"/>
                 <a:cs typeface="Arial" pitchFamily="34" charset="-120"/>
               </a:rPr>
-              <a:t>Next up is the gap profile by column so we can target the worst offenders.</a:t>
-            </a:r>
-            <a:endParaRPr lang="en-US" sz="1600" dirty="0"/>
-          </a:p>
-        </p:txBody>
-      </p:sp>
+              <a:t>Soil probes can go dark for days while the weather tower keeps logging. Power loss knocks out every channel at once, which is why the code trims dataset ends. Each plot recovers on its own schedule, so we avoid borrowing from neighbours.</a:t>
+            </a:r>
+            <a:endParaRPr lang="en-US" sz="1450" dirty="0"/>
+          </a:p>
+        </p:txBody>
+      </p:sp>
+      <p:sp>
+        <p:nvSpPr>
+          <p:cNvPr id="7" name="Text 5"/>
+          <p:cNvSpPr/>
+          <p:nvPr/>
+        </p:nvSpPr>
+        <p:spPr>
+          <a:xfrm>
+            <a:off x="5359598" y="1333500"/>
+            <a:ext cx="3085951" cy="3810000"/>
+          </a:xfrm>
+          <a:prstGeom prst="rect">
+            <a:avLst/>
+          </a:prstGeom>
+          <a:solidFill>
+            <a:srgbClr val="FFE7D1"/>
+          </a:solidFill>
+          <a:ln w="19050">
+            <a:solidFill>
+              <a:srgbClr val="C24B0A"/>
+            </a:solidFill>
+          </a:ln>
+        </p:spPr>
+        <p:txBody>
+          <a:bodyPr wrap="square" rtlCol="0" anchor="ctr"/>
+          <a:lstStyle/>
+          <a:p>
+            <a:pPr indent="0" marL="0">
+              <a:buNone/>
+            </a:pPr>
+            <a:endParaRPr lang="en-US" dirty="0"/>
+          </a:p>
+        </p:txBody>
+      </p:sp>
+      <p:pic>
+        <p:nvPicPr>
+          <p:cNvPr id="8" name="Image 0" descr="/home/bryan/presentation/slide-maker/workspace/images/eda_assets/dataset_missing_values_by_column.png">    </p:cNvPr>
+          <p:cNvPicPr>
+            <a:picLocks noChangeAspect="1"/>
+          </p:cNvPicPr>
+          <p:nvPr/>
+        </p:nvPicPr>
+        <p:blipFill>
+          <a:blip r:embed="rId1"/>
+          <a:stretch>
+            <a:fillRect/>
+          </a:stretch>
+        </p:blipFill>
+        <p:spPr>
+          <a:xfrm>
+            <a:off x="5632549" y="2603450"/>
+            <a:ext cx="2539901" cy="1269950"/>
+          </a:xfrm>
+          <a:prstGeom prst="rect">
+            <a:avLst/>
+          </a:prstGeom>
+        </p:spPr>
+      </p:pic>
     </p:spTree>
   </p:cSld>
   <p:clrMapOvr>
@@ -9568,7 +9658,7 @@
         <p:spPr>
           <a:xfrm>
             <a:off x="0" y="0"/>
-            <a:ext cx="9144000" cy="1025426"/>
+            <a:ext cx="9144000" cy="1054001"/>
           </a:xfrm>
           <a:prstGeom prst="rect">
             <a:avLst/>
@@ -9598,7 +9688,7 @@
         <p:spPr>
           <a:xfrm>
             <a:off x="609600" y="279350"/>
-            <a:ext cx="8083296" cy="466725"/>
+            <a:ext cx="8083296" cy="495300"/>
           </a:xfrm>
           <a:prstGeom prst="rect">
             <a:avLst/>
@@ -9614,7 +9704,7 @@
               <a:buNone/>
             </a:pPr>
             <a:r>
-              <a:rPr lang="en-US" sz="3200" b="1" dirty="0">
+              <a:rPr lang="en-US" sz="3400" b="1" dirty="0">
                 <a:solidFill>
                   <a:srgbClr val="FFF5EB"/>
                 </a:solidFill>
@@ -9622,9 +9712,9 @@
                 <a:ea typeface="Arial" pitchFamily="34" charset="-122"/>
                 <a:cs typeface="Arial" pitchFamily="34" charset="-120"/>
               </a:rPr>
-              <a:t>Gap Profile by Sensor Channel</a:t>
-            </a:r>
-            <a:endParaRPr lang="en-US" sz="3200" dirty="0"/>
+              <a:t>Raw VWC Before Any Cleaning</a:t>
+            </a:r>
+            <a:endParaRPr lang="en-US" sz="3400" dirty="0"/>
           </a:p>
         </p:txBody>
       </p:sp>
@@ -9636,8 +9726,8 @@
         </p:nvSpPr>
         <p:spPr>
           <a:xfrm>
-            <a:off x="685800" y="1460450"/>
-            <a:ext cx="7772400" cy="445591"/>
+            <a:off x="762000" y="1396901"/>
+            <a:ext cx="7772400" cy="883593"/>
           </a:xfrm>
           <a:prstGeom prst="rect">
             <a:avLst/>
@@ -9649,17 +9739,14 @@
           <a:bodyPr wrap="square" lIns="0" tIns="0" rIns="0" bIns="0" rtlCol="0" anchor="t"/>
           <a:lstStyle/>
           <a:p>
-            <a:pPr algn="ctr" indent="0" marL="0">
+            <a:pPr algn="l" indent="0" marL="0">
               <a:lnSpc>
-                <a:spcPts val="1755"/>
+                <a:spcPts val="2320"/>
               </a:lnSpc>
-              <a:spcAft>
-                <a:spcPts val="600"/>
-              </a:spcAft>
-              <a:buNone/>
-            </a:pPr>
-            <a:r>
-              <a:rPr lang="en-US" sz="1350" dirty="0">
+              <a:buNone/>
+            </a:pPr>
+            <a:r>
+              <a:rPr lang="en-US" sz="1600" dirty="0">
                 <a:solidFill>
                   <a:srgbClr val="433024"/>
                 </a:solidFill>
@@ -9667,9 +9754,9 @@
                 <a:ea typeface="Arial" pitchFamily="34" charset="-122"/>
                 <a:cs typeface="Arial" pitchFamily="34" charset="-120"/>
               </a:rPr>
-              <a:t>Missing hours pile up fastest in the soil moisture depths, confirming the need for careful interpolation.</a:t>
-            </a:r>
-            <a:endParaRPr lang="en-US" sz="1350" dirty="0"/>
+              <a:t>Here are two plots straight from the logger. Plot 2003 is the worst case—long outages and jagged spikes. Plot 2014 is comparatively clean but still loses hours after storms.</a:t>
+            </a:r>
+            <a:endParaRPr lang="en-US" sz="1600" dirty="0"/>
           </a:p>
         </p:txBody>
       </p:sp>
@@ -9681,8 +9768,8 @@
         </p:nvSpPr>
         <p:spPr>
           <a:xfrm>
-            <a:off x="590550" y="2185392"/>
-            <a:ext cx="7962900" cy="2882801"/>
+            <a:off x="762000" y="2458194"/>
+            <a:ext cx="3733800" cy="1850529"/>
           </a:xfrm>
           <a:prstGeom prst="rect">
             <a:avLst/>
@@ -9709,7 +9796,7 @@
       </p:sp>
       <p:pic>
         <p:nvPicPr>
-          <p:cNvPr id="6" name="Image 0" descr="/home/bryan/presentation/slide-maker/workspace/images/eda_assets/dataset_missing_values_by_column.png">    </p:cNvPr>
+          <p:cNvPr id="6" name="Image 0" descr="/home/bryan/presentation/slide-maker/workspace/images/eda_assets/plot2003_raw_hourly_vwc_all_depths.png">    </p:cNvPr>
           <p:cNvPicPr>
             <a:picLocks noChangeAspect="1"/>
           </p:cNvPicPr>
@@ -9723,14 +9810,156 @@
         </p:blipFill>
         <p:spPr>
           <a:xfrm>
-            <a:off x="2032099" y="2356842"/>
-            <a:ext cx="5079802" cy="2539901"/>
+            <a:off x="1168598" y="2604195"/>
+            <a:ext cx="2920603" cy="1216968"/>
           </a:xfrm>
           <a:prstGeom prst="rect">
             <a:avLst/>
           </a:prstGeom>
         </p:spPr>
       </p:pic>
+      <p:sp>
+        <p:nvSpPr>
+          <p:cNvPr id="7" name="Text 4"/>
+          <p:cNvSpPr/>
+          <p:nvPr/>
+        </p:nvSpPr>
+        <p:spPr>
+          <a:xfrm>
+            <a:off x="968006" y="3922663"/>
+            <a:ext cx="3321638" cy="240060"/>
+          </a:xfrm>
+          <a:prstGeom prst="rect">
+            <a:avLst/>
+          </a:prstGeom>
+          <a:noFill/>
+          <a:ln/>
+        </p:spPr>
+        <p:txBody>
+          <a:bodyPr wrap="square" lIns="0" tIns="0" rIns="0" bIns="0" rtlCol="0" anchor="t"/>
+          <a:lstStyle/>
+          <a:p>
+            <a:pPr algn="ctr" indent="0" marL="0">
+              <a:lnSpc>
+                <a:spcPts val="1890"/>
+              </a:lnSpc>
+              <a:buNone/>
+            </a:pPr>
+            <a:r>
+              <a:rPr lang="en-US" sz="1400" dirty="0">
+                <a:solidFill>
+                  <a:srgbClr val="433024"/>
+                </a:solidFill>
+                <a:latin typeface="Arial" pitchFamily="34" charset="0"/>
+                <a:ea typeface="Arial" pitchFamily="34" charset="-122"/>
+                <a:cs typeface="Arial" pitchFamily="34" charset="-120"/>
+              </a:rPr>
+              <a:t>Plot 2003 · Worst gaps and sensor noise.</a:t>
+            </a:r>
+            <a:endParaRPr lang="en-US" sz="1400" dirty="0"/>
+          </a:p>
+        </p:txBody>
+      </p:sp>
+      <p:sp>
+        <p:nvSpPr>
+          <p:cNvPr id="8" name="Text 5"/>
+          <p:cNvSpPr/>
+          <p:nvPr/>
+        </p:nvSpPr>
+        <p:spPr>
+          <a:xfrm>
+            <a:off x="4648200" y="2458194"/>
+            <a:ext cx="3733800" cy="1850529"/>
+          </a:xfrm>
+          <a:prstGeom prst="rect">
+            <a:avLst/>
+          </a:prstGeom>
+          <a:solidFill>
+            <a:srgbClr val="FFE7D1"/>
+          </a:solidFill>
+          <a:ln w="19050">
+            <a:solidFill>
+              <a:srgbClr val="C24B0A"/>
+            </a:solidFill>
+          </a:ln>
+        </p:spPr>
+        <p:txBody>
+          <a:bodyPr wrap="square" rtlCol="0" anchor="ctr"/>
+          <a:lstStyle/>
+          <a:p>
+            <a:pPr indent="0" marL="0">
+              <a:buNone/>
+            </a:pPr>
+            <a:endParaRPr lang="en-US" dirty="0"/>
+          </a:p>
+        </p:txBody>
+      </p:sp>
+      <p:pic>
+        <p:nvPicPr>
+          <p:cNvPr id="9" name="Image 1" descr="/home/bryan/presentation/slide-maker/workspace/images/eda_assets/plot2014_raw_hourly_vwc_all_depths.png">    </p:cNvPr>
+          <p:cNvPicPr>
+            <a:picLocks noChangeAspect="1"/>
+          </p:cNvPicPr>
+          <p:nvPr/>
+        </p:nvPicPr>
+        <p:blipFill>
+          <a:blip r:embed="rId2"/>
+          <a:stretch>
+            <a:fillRect/>
+          </a:stretch>
+        </p:blipFill>
+        <p:spPr>
+          <a:xfrm>
+            <a:off x="5054798" y="2604195"/>
+            <a:ext cx="2920603" cy="1216968"/>
+          </a:xfrm>
+          <a:prstGeom prst="rect">
+            <a:avLst/>
+          </a:prstGeom>
+        </p:spPr>
+      </p:pic>
+      <p:sp>
+        <p:nvSpPr>
+          <p:cNvPr id="10" name="Text 6"/>
+          <p:cNvSpPr/>
+          <p:nvPr/>
+        </p:nvSpPr>
+        <p:spPr>
+          <a:xfrm>
+            <a:off x="4772232" y="3922663"/>
+            <a:ext cx="3485587" cy="240060"/>
+          </a:xfrm>
+          <a:prstGeom prst="rect">
+            <a:avLst/>
+          </a:prstGeom>
+          <a:noFill/>
+          <a:ln/>
+        </p:spPr>
+        <p:txBody>
+          <a:bodyPr wrap="square" lIns="0" tIns="0" rIns="0" bIns="0" rtlCol="0" anchor="t"/>
+          <a:lstStyle/>
+          <a:p>
+            <a:pPr algn="ctr" indent="0" marL="0">
+              <a:lnSpc>
+                <a:spcPts val="1890"/>
+              </a:lnSpc>
+              <a:buNone/>
+            </a:pPr>
+            <a:r>
+              <a:rPr lang="en-US" sz="1400" dirty="0">
+                <a:solidFill>
+                  <a:srgbClr val="433024"/>
+                </a:solidFill>
+                <a:latin typeface="Arial" pitchFamily="34" charset="0"/>
+                <a:ea typeface="Arial" pitchFamily="34" charset="-122"/>
+                <a:cs typeface="Arial" pitchFamily="34" charset="-120"/>
+              </a:rPr>
+              <a:t>Plot 2014 · Cleaner but still missing storms.</a:t>
+            </a:r>
+            <a:endParaRPr lang="en-US" sz="1400" dirty="0"/>
+          </a:p>
+        </p:txBody>
+      </p:sp>
     </p:spTree>
   </p:cSld>
   <p:clrMapOvr>

</xml_diff>

<commit_message>
Integrate final visuals for features, modeling, and validation
</commit_message>
<xml_diff>
--- a/workspace/presentations/eda-lstm-vwc-prediction.pptx
+++ b/workspace/presentations/eda-lstm-vwc-prediction.pptx
@@ -5976,7 +5976,41 @@
         <p:spPr>
           <a:xfrm>
             <a:off x="762000" y="1396901"/>
-            <a:ext cx="3653332" cy="2964359"/>
+            <a:ext cx="3708350" cy="3346847"/>
+          </a:xfrm>
+          <a:prstGeom prst="rect">
+            <a:avLst/>
+          </a:prstGeom>
+          <a:solidFill>
+            <a:srgbClr val="FFE7D1"/>
+          </a:solidFill>
+          <a:ln w="19050">
+            <a:solidFill>
+              <a:srgbClr val="C24B0A"/>
+            </a:solidFill>
+          </a:ln>
+        </p:spPr>
+        <p:txBody>
+          <a:bodyPr wrap="square" rtlCol="0" anchor="ctr"/>
+          <a:lstStyle/>
+          <a:p>
+            <a:pPr indent="0" marL="0">
+              <a:buNone/>
+            </a:pPr>
+            <a:endParaRPr lang="en-US" dirty="0"/>
+          </a:p>
+        </p:txBody>
+      </p:sp>
+      <p:sp>
+        <p:nvSpPr>
+          <p:cNvPr id="5" name="Text 3"/>
+          <p:cNvSpPr/>
+          <p:nvPr/>
+        </p:nvSpPr>
+        <p:spPr>
+          <a:xfrm>
+            <a:off x="984200" y="1593652"/>
+            <a:ext cx="3329229" cy="1165175"/>
           </a:xfrm>
           <a:prstGeom prst="rect">
             <a:avLst/>
@@ -5990,12 +6024,12 @@
           <a:p>
             <a:pPr algn="l" indent="0" marL="0">
               <a:lnSpc>
-                <a:spcPts val="2320"/>
+                <a:spcPts val="1820"/>
               </a:lnSpc>
               <a:buNone/>
             </a:pPr>
             <a:r>
-              <a:rPr lang="en-US" sz="1600" dirty="0">
+              <a:rPr lang="en-US" sz="1400" dirty="0">
                 <a:solidFill>
                   <a:srgbClr val="433024"/>
                 </a:solidFill>
@@ -6003,16 +6037,16 @@
                 <a:ea typeface="Arial" pitchFamily="34" charset="-122"/>
                 <a:cs typeface="Arial" pitchFamily="34" charset="-120"/>
               </a:rPr>
-              <a:t>The notebook tracks how long the soil has been drying (</a:t>
+              <a:t>We store three water-history features: days since the last ≥0.2 in event, a 7-day precipitation+irrigation sum, and </a:t>
             </a:r>
             <a:pPr algn="l" indent="0" marL="0">
               <a:lnSpc>
-                <a:spcPts val="2320"/>
+                <a:spcPts val="1820"/>
               </a:lnSpc>
               <a:buNone/>
             </a:pPr>
             <a:r>
-              <a:rPr lang="en-US" sz="1600" dirty="0">
+              <a:rPr lang="en-US" sz="1400" dirty="0">
                 <a:solidFill>
                   <a:srgbClr val="433024"/>
                 </a:solidFill>
@@ -6020,16 +6054,16 @@
                 <a:ea typeface="Arial" pitchFamily="34" charset="-122"/>
                 <a:cs typeface="Arial" pitchFamily="34" charset="-120"/>
               </a:rPr>
-              <a:t>time_since_last_precip</a:t>
+              <a:t>log(precip_irrig + 1)</a:t>
             </a:r>
             <a:pPr algn="l" indent="0" marL="0">
               <a:lnSpc>
-                <a:spcPts val="2320"/>
+                <a:spcPts val="1820"/>
               </a:lnSpc>
               <a:buNone/>
             </a:pPr>
             <a:r>
-              <a:rPr lang="en-US" sz="1600" dirty="0">
+              <a:rPr lang="en-US" sz="1400" dirty="0">
                 <a:solidFill>
                   <a:srgbClr val="433024"/>
                 </a:solidFill>
@@ -6037,60 +6071,26 @@
                 <a:ea typeface="Arial" pitchFamily="34" charset="-122"/>
                 <a:cs typeface="Arial" pitchFamily="34" charset="-120"/>
               </a:rPr>
-              <a:t>), how much water arrived in the past week, and a log-transformed irrigation signal so micro-pulses survive scaling. The counter resets whenever </a:t>
-            </a:r>
-            <a:pPr algn="l" indent="0" marL="0">
-              <a:lnSpc>
-                <a:spcPts val="2320"/>
-              </a:lnSpc>
-              <a:buNone/>
-            </a:pPr>
-            <a:r>
-              <a:rPr lang="en-US" sz="1600" dirty="0">
-                <a:solidFill>
-                  <a:srgbClr val="433024"/>
-                </a:solidFill>
-                <a:latin typeface="Arial" pitchFamily="34" charset="0"/>
-                <a:ea typeface="Arial" pitchFamily="34" charset="-122"/>
-                <a:cs typeface="Arial" pitchFamily="34" charset="-120"/>
-              </a:rPr>
-              <a:t>precip_irrig</a:t>
-            </a:r>
-            <a:pPr algn="l" indent="0" marL="0">
-              <a:lnSpc>
-                <a:spcPts val="2320"/>
-              </a:lnSpc>
-              <a:buNone/>
-            </a:pPr>
-            <a:r>
-              <a:rPr lang="en-US" sz="1600" dirty="0">
-                <a:solidFill>
-                  <a:srgbClr val="433024"/>
-                </a:solidFill>
-                <a:latin typeface="Arial" pitchFamily="34" charset="0"/>
-                <a:ea typeface="Arial" pitchFamily="34" charset="-122"/>
-                <a:cs typeface="Arial" pitchFamily="34" charset="-120"/>
-              </a:rPr>
-              <a:t> tops 0.2 in (≈5 mm), and the seven-day sum shows how much water remains in the soil.</a:t>
-            </a:r>
-            <a:endParaRPr lang="en-US" sz="1600" dirty="0"/>
-          </a:p>
-        </p:txBody>
-      </p:sp>
-      <p:sp>
-        <p:nvSpPr>
-          <p:cNvPr id="5" name="Text 3"/>
-          <p:cNvSpPr/>
-          <p:nvPr/>
-        </p:nvSpPr>
-        <p:spPr>
-          <a:xfrm>
-            <a:off x="4648498" y="1396901"/>
-            <a:ext cx="3733502" cy="2051298"/>
+              <a:t> so tiny pulses survive scaling.</a:t>
+            </a:r>
+            <a:endParaRPr lang="en-US" sz="1400" dirty="0"/>
+          </a:p>
+        </p:txBody>
+      </p:sp>
+      <p:sp>
+        <p:nvSpPr>
+          <p:cNvPr id="6" name="Text 4"/>
+          <p:cNvSpPr/>
+          <p:nvPr/>
+        </p:nvSpPr>
+        <p:spPr>
+          <a:xfrm>
+            <a:off x="984200" y="2885777"/>
+            <a:ext cx="3263950" cy="1661220"/>
           </a:xfrm>
           <a:prstGeom prst="roundRect">
             <a:avLst>
-              <a:gd name="adj" fmla="val 6191"/>
+              <a:gd name="adj" fmla="val 7645"/>
             </a:avLst>
           </a:prstGeom>
           <a:solidFill>
@@ -6115,7 +6115,7 @@
       </p:sp>
       <p:pic>
         <p:nvPicPr>
-          <p:cNvPr id="6" name="Image 0" descr="/home/bryan/presentation/slide-maker/workspace/images/formulas/formula_minmax.png">    </p:cNvPr>
+          <p:cNvPr id="7" name="Image 0" descr="/home/bryan/presentation/slide-maker/workspace/images/formulas/formula_minmax.png">    </p:cNvPr>
           <p:cNvPicPr>
             <a:picLocks noChangeAspect="1"/>
           </p:cNvPicPr>
@@ -6129,8 +6129,8 @@
         </p:blipFill>
         <p:spPr>
           <a:xfrm>
-            <a:off x="4864298" y="1561951"/>
-            <a:ext cx="3301901" cy="987623"/>
+            <a:off x="1409700" y="3025378"/>
+            <a:ext cx="2412950" cy="721668"/>
           </a:xfrm>
           <a:prstGeom prst="rect">
             <a:avLst/>
@@ -6139,14 +6139,14 @@
       </p:pic>
       <p:sp>
         <p:nvSpPr>
-          <p:cNvPr id="7" name="Text 4"/>
-          <p:cNvSpPr/>
-          <p:nvPr/>
-        </p:nvSpPr>
-        <p:spPr>
-          <a:xfrm>
-            <a:off x="4831279" y="2663875"/>
-            <a:ext cx="3367939" cy="619274"/>
+          <p:cNvPr id="8" name="Text 5"/>
+          <p:cNvSpPr/>
+          <p:nvPr/>
+        </p:nvSpPr>
+        <p:spPr>
+          <a:xfrm>
+            <a:off x="1171678" y="3835896"/>
+            <a:ext cx="2888995" cy="571500"/>
           </a:xfrm>
           <a:prstGeom prst="rect">
             <a:avLst/>
@@ -6160,15 +6160,15 @@
           <a:p>
             <a:pPr algn="ctr" indent="0" marL="0">
               <a:lnSpc>
-                <a:spcPts val="1625"/>
+                <a:spcPts val="1500"/>
               </a:lnSpc>
               <a:spcBef>
-                <a:spcPts val="600"/>
+                <a:spcPts val="400"/>
               </a:spcBef>
               <a:buNone/>
             </a:pPr>
             <a:r>
-              <a:rPr lang="en-US" sz="1250" dirty="0">
+              <a:rPr lang="en-US" sz="1200" dirty="0">
                 <a:solidFill>
                   <a:srgbClr val="FFF5EB"/>
                 </a:solidFill>
@@ -6178,20 +6178,78 @@
               </a:rPr>
               <a:t>A 30% buffer keeps scaled features inside [0,1] even when validation plots see more water than training.</a:t>
             </a:r>
-            <a:endParaRPr lang="en-US" sz="1250" dirty="0"/>
-          </a:p>
-        </p:txBody>
-      </p:sp>
-      <p:sp>
-        <p:nvSpPr>
-          <p:cNvPr id="8" name="Text 5"/>
-          <p:cNvSpPr/>
-          <p:nvPr/>
-        </p:nvSpPr>
-        <p:spPr>
-          <a:xfrm>
-            <a:off x="4648498" y="3752999"/>
-            <a:ext cx="3808172" cy="496788"/>
+            <a:endParaRPr lang="en-US" sz="1200" dirty="0"/>
+          </a:p>
+        </p:txBody>
+      </p:sp>
+      <p:sp>
+        <p:nvSpPr>
+          <p:cNvPr id="9" name="Text 6"/>
+          <p:cNvSpPr/>
+          <p:nvPr/>
+        </p:nvSpPr>
+        <p:spPr>
+          <a:xfrm>
+            <a:off x="4673501" y="1396901"/>
+            <a:ext cx="3708499" cy="3238054"/>
+          </a:xfrm>
+          <a:prstGeom prst="rect">
+            <a:avLst/>
+          </a:prstGeom>
+          <a:solidFill>
+            <a:srgbClr val="FFE7D1"/>
+          </a:solidFill>
+          <a:ln w="19050">
+            <a:solidFill>
+              <a:srgbClr val="C24B0A"/>
+            </a:solidFill>
+          </a:ln>
+        </p:spPr>
+        <p:txBody>
+          <a:bodyPr wrap="square" rtlCol="0" anchor="ctr"/>
+          <a:lstStyle/>
+          <a:p>
+            <a:pPr indent="0" marL="0">
+              <a:buNone/>
+            </a:pPr>
+            <a:endParaRPr lang="en-US" dirty="0"/>
+          </a:p>
+        </p:txBody>
+      </p:sp>
+      <p:pic>
+        <p:nvPicPr>
+          <p:cNvPr id="10" name="Image 1" descr="/home/bryan/presentation/slide-maker/workspace/images/final_visualizations/05_sinusoidal_encoding_unit_circle_explanation.png">    </p:cNvPr>
+          <p:cNvPicPr>
+            <a:picLocks noChangeAspect="1"/>
+          </p:cNvPicPr>
+          <p:nvPr/>
+        </p:nvPicPr>
+        <p:blipFill>
+          <a:blip r:embed="rId2"/>
+          <a:stretch>
+            <a:fillRect/>
+          </a:stretch>
+        </p:blipFill>
+        <p:spPr>
+          <a:xfrm>
+            <a:off x="5394871" y="1542901"/>
+            <a:ext cx="2265611" cy="2031950"/>
+          </a:xfrm>
+          <a:prstGeom prst="rect">
+            <a:avLst/>
+          </a:prstGeom>
+        </p:spPr>
+      </p:pic>
+      <p:sp>
+        <p:nvSpPr>
+          <p:cNvPr id="11" name="Text 7"/>
+          <p:cNvSpPr/>
+          <p:nvPr/>
+        </p:nvSpPr>
+        <p:spPr>
+          <a:xfrm>
+            <a:off x="4785336" y="3676352"/>
+            <a:ext cx="3484828" cy="812602"/>
           </a:xfrm>
           <a:prstGeom prst="rect">
             <a:avLst/>
@@ -6203,17 +6261,14 @@
           <a:bodyPr wrap="square" lIns="0" tIns="0" rIns="0" bIns="0" rtlCol="0" anchor="t"/>
           <a:lstStyle/>
           <a:p>
-            <a:pPr algn="l" indent="0" marL="0">
+            <a:pPr algn="ctr" indent="0" marL="0">
               <a:lnSpc>
-                <a:spcPts val="1958"/>
+                <a:spcPts val="1600"/>
               </a:lnSpc>
-              <a:spcBef>
-                <a:spcPts val="1200"/>
-              </a:spcBef>
-              <a:buNone/>
-            </a:pPr>
-            <a:r>
-              <a:rPr lang="en-US" sz="1450" dirty="0">
+              <a:buNone/>
+            </a:pPr>
+            <a:r>
+              <a:rPr lang="en-US" sz="1280" dirty="0">
                 <a:solidFill>
                   <a:srgbClr val="433024"/>
                 </a:solidFill>
@@ -6221,9 +6276,9 @@
                 <a:ea typeface="Arial" pitchFamily="34" charset="-122"/>
                 <a:cs typeface="Arial" pitchFamily="34" charset="-120"/>
               </a:rPr>
-              <a:t>If we ever hit the bounds, we can widen the buffer or fit scalers per treatment block.</a:t>
-            </a:r>
-            <a:endParaRPr lang="en-US" sz="1450" dirty="0"/>
+              <a:t>Sinusoidal encodings keep midnight next to 11 pm and preserve daily cycles without jumps; the code adds sin/cos terms for hour, day, and day-of-week.</a:t>
+            </a:r>
+            <a:endParaRPr lang="en-US" sz="1280" dirty="0"/>
           </a:p>
         </p:txBody>
       </p:sp>
@@ -7040,7 +7095,7 @@
         <p:spPr>
           <a:xfrm>
             <a:off x="0" y="0"/>
-            <a:ext cx="9144000" cy="1054001"/>
+            <a:ext cx="9144000" cy="1025426"/>
           </a:xfrm>
           <a:prstGeom prst="rect">
             <a:avLst/>
@@ -7070,7 +7125,7 @@
         <p:spPr>
           <a:xfrm>
             <a:off x="609600" y="279350"/>
-            <a:ext cx="8083296" cy="495300"/>
+            <a:ext cx="8083296" cy="466725"/>
           </a:xfrm>
           <a:prstGeom prst="rect">
             <a:avLst/>
@@ -7086,7 +7141,7 @@
               <a:buNone/>
             </a:pPr>
             <a:r>
-              <a:rPr lang="en-US" sz="3400" b="1" dirty="0">
+              <a:rPr lang="en-US" sz="3200" b="1" dirty="0">
                 <a:solidFill>
                   <a:srgbClr val="FFF5EB"/>
                 </a:solidFill>
@@ -7094,9 +7149,9 @@
                 <a:ea typeface="Arial" pitchFamily="34" charset="-122"/>
                 <a:cs typeface="Arial" pitchFamily="34" charset="-120"/>
               </a:rPr>
-              <a:t>How We Frame the Forecast</a:t>
-            </a:r>
-            <a:endParaRPr lang="en-US" sz="3400" dirty="0"/>
+              <a:t>How We Feed and Validate the Model</a:t>
+            </a:r>
+            <a:endParaRPr lang="en-US" sz="3200" dirty="0"/>
           </a:p>
         </p:txBody>
       </p:sp>
@@ -7108,8 +7163,66 @@
         </p:nvSpPr>
         <p:spPr>
           <a:xfrm>
-            <a:off x="762000" y="1396901"/>
-            <a:ext cx="7772400" cy="1178123"/>
+            <a:off x="698450" y="1396901"/>
+            <a:ext cx="3771900" cy="2730698"/>
+          </a:xfrm>
+          <a:prstGeom prst="rect">
+            <a:avLst/>
+          </a:prstGeom>
+          <a:solidFill>
+            <a:srgbClr val="FFE7D1"/>
+          </a:solidFill>
+          <a:ln w="19050">
+            <a:solidFill>
+              <a:srgbClr val="C24B0A"/>
+            </a:solidFill>
+          </a:ln>
+        </p:spPr>
+        <p:txBody>
+          <a:bodyPr wrap="square" rtlCol="0" anchor="ctr"/>
+          <a:lstStyle/>
+          <a:p>
+            <a:pPr indent="0" marL="0">
+              <a:buNone/>
+            </a:pPr>
+            <a:endParaRPr lang="en-US" dirty="0"/>
+          </a:p>
+        </p:txBody>
+      </p:sp>
+      <p:pic>
+        <p:nvPicPr>
+          <p:cNvPr id="5" name="Image 0" descr="/home/bryan/presentation/slide-maker/workspace/images/final_visualizations/03_sliding_window_prediction_horizon_diagram.png">    </p:cNvPr>
+          <p:cNvPicPr>
+            <a:picLocks noChangeAspect="1"/>
+          </p:cNvPicPr>
+          <p:nvPr/>
+        </p:nvPicPr>
+        <p:blipFill>
+          <a:blip r:embed="rId1"/>
+          <a:stretch>
+            <a:fillRect/>
+          </a:stretch>
+        </p:blipFill>
+        <p:spPr>
+          <a:xfrm>
+            <a:off x="679549" y="1568351"/>
+            <a:ext cx="3809851" cy="1131243"/>
+          </a:xfrm>
+          <a:prstGeom prst="rect">
+            <a:avLst/>
+          </a:prstGeom>
+        </p:spPr>
+      </p:pic>
+      <p:sp>
+        <p:nvSpPr>
+          <p:cNvPr id="6" name="Text 3"/>
+          <p:cNvSpPr/>
+          <p:nvPr/>
+        </p:nvSpPr>
+        <p:spPr>
+          <a:xfrm>
+            <a:off x="835610" y="2826544"/>
+            <a:ext cx="3497580" cy="745182"/>
           </a:xfrm>
           <a:prstGeom prst="rect">
             <a:avLst/>
@@ -7121,14 +7234,14 @@
           <a:bodyPr wrap="square" lIns="0" tIns="0" rIns="0" bIns="0" rtlCol="0" anchor="t"/>
           <a:lstStyle/>
           <a:p>
-            <a:pPr algn="l" indent="0" marL="0">
+            <a:pPr algn="ctr" indent="0" marL="0">
               <a:lnSpc>
-                <a:spcPts val="2320"/>
+                <a:spcPts val="1958"/>
               </a:lnSpc>
               <a:buNone/>
             </a:pPr>
             <a:r>
-              <a:rPr lang="en-US" sz="1600" dirty="0">
+              <a:rPr lang="en-US" sz="1450" dirty="0">
                 <a:solidFill>
                   <a:srgbClr val="433024"/>
                 </a:solidFill>
@@ -7136,22 +7249,80 @@
                 <a:ea typeface="Arial" pitchFamily="34" charset="-122"/>
                 <a:cs typeface="Arial" pitchFamily="34" charset="-120"/>
               </a:rPr>
-              <a:t>For every plot the notebook takes a seven-day window of scaled features and asks the LSTM to predict VWC four days ahead. That window length mirrors the grower’s four-day irrigation cadence—enough history to see the last watering and the dry-down that followed.</a:t>
-            </a:r>
-            <a:endParaRPr lang="en-US" sz="1600" dirty="0"/>
-          </a:p>
-        </p:txBody>
-      </p:sp>
-      <p:sp>
-        <p:nvSpPr>
-          <p:cNvPr id="5" name="Text 3"/>
-          <p:cNvSpPr/>
-          <p:nvPr/>
-        </p:nvSpPr>
-        <p:spPr>
-          <a:xfrm>
-            <a:off x="762000" y="2778175"/>
-            <a:ext cx="7772400" cy="1472654"/>
+              <a:t>Seven days in, four days out. We currently slide the window forward one day at a time, so forecasts overlap.</a:t>
+            </a:r>
+            <a:endParaRPr lang="en-US" sz="1450" dirty="0"/>
+          </a:p>
+        </p:txBody>
+      </p:sp>
+      <p:sp>
+        <p:nvSpPr>
+          <p:cNvPr id="7" name="Text 4"/>
+          <p:cNvSpPr/>
+          <p:nvPr/>
+        </p:nvSpPr>
+        <p:spPr>
+          <a:xfrm>
+            <a:off x="4673501" y="1396901"/>
+            <a:ext cx="3772049" cy="2730698"/>
+          </a:xfrm>
+          <a:prstGeom prst="rect">
+            <a:avLst/>
+          </a:prstGeom>
+          <a:solidFill>
+            <a:srgbClr val="FFE7D1"/>
+          </a:solidFill>
+          <a:ln w="19050">
+            <a:solidFill>
+              <a:srgbClr val="C24B0A"/>
+            </a:solidFill>
+          </a:ln>
+        </p:spPr>
+        <p:txBody>
+          <a:bodyPr wrap="square" rtlCol="0" anchor="ctr"/>
+          <a:lstStyle/>
+          <a:p>
+            <a:pPr indent="0" marL="0">
+              <a:buNone/>
+            </a:pPr>
+            <a:endParaRPr lang="en-US" dirty="0"/>
+          </a:p>
+        </p:txBody>
+      </p:sp>
+      <p:pic>
+        <p:nvPicPr>
+          <p:cNvPr id="8" name="Image 1" descr="/home/bryan/presentation/slide-maker/workspace/images/final_visualizations/06_cross_validation_multiple_plots_diagram.png">    </p:cNvPr>
+          <p:cNvPicPr>
+            <a:picLocks noChangeAspect="1"/>
+          </p:cNvPicPr>
+          <p:nvPr/>
+        </p:nvPicPr>
+        <p:blipFill>
+          <a:blip r:embed="rId2"/>
+          <a:stretch>
+            <a:fillRect/>
+          </a:stretch>
+        </p:blipFill>
+        <p:spPr>
+          <a:xfrm>
+            <a:off x="4654748" y="1568351"/>
+            <a:ext cx="3809702" cy="1101477"/>
+          </a:xfrm>
+          <a:prstGeom prst="rect">
+            <a:avLst/>
+          </a:prstGeom>
+        </p:spPr>
+      </p:pic>
+      <p:sp>
+        <p:nvSpPr>
+          <p:cNvPr id="9" name="Text 5"/>
+          <p:cNvSpPr/>
+          <p:nvPr/>
+        </p:nvSpPr>
+        <p:spPr>
+          <a:xfrm>
+            <a:off x="4810659" y="2796778"/>
+            <a:ext cx="3497732" cy="993577"/>
           </a:xfrm>
           <a:prstGeom prst="rect">
             <a:avLst/>
@@ -7163,14 +7334,14 @@
           <a:bodyPr wrap="square" lIns="0" tIns="0" rIns="0" bIns="0" rtlCol="0" anchor="t"/>
           <a:lstStyle/>
           <a:p>
-            <a:pPr algn="l" indent="0" marL="0">
+            <a:pPr algn="ctr" indent="0" marL="0">
               <a:lnSpc>
-                <a:spcPts val="2320"/>
+                <a:spcPts val="1958"/>
               </a:lnSpc>
               <a:buNone/>
             </a:pPr>
             <a:r>
-              <a:rPr lang="en-US" sz="1600" dirty="0">
+              <a:rPr lang="en-US" sz="1450" dirty="0">
                 <a:solidFill>
                   <a:srgbClr val="433024"/>
                 </a:solidFill>
@@ -7178,9 +7349,9 @@
                 <a:ea typeface="Arial" pitchFamily="34" charset="-122"/>
                 <a:cs typeface="Arial" pitchFamily="34" charset="-120"/>
               </a:rPr>
-              <a:t>Right now we slide the window forward one day at a time, so neighbouring sequences overlap. That keeps the training set large but can blur independent decisions. If we want strictly non-overlapping forecasts we could stride by four days instead. Each window covers seven days of features and produces four future days of VWC for all three depths.</a:t>
-            </a:r>
-            <a:endParaRPr lang="en-US" sz="1600" dirty="0"/>
+              <a:t>TimeSeriesSplit keeps each plot chronological: orange windows train, green windows validate across the RCBD blocks.</a:t>
+            </a:r>
+            <a:endParaRPr lang="en-US" sz="1450" dirty="0"/>
           </a:p>
         </p:txBody>
       </p:sp>
@@ -7279,7 +7450,7 @@
                 <a:ea typeface="Arial" pitchFamily="34" charset="-122"/>
                 <a:cs typeface="Arial" pitchFamily="34" charset="-120"/>
               </a:rPr>
-              <a:t>LSTM Stack &amp; Training Setup</a:t>
+              <a:t>LSTM Stack Used in Training</a:t>
             </a:r>
             <a:endParaRPr lang="en-US" sz="3400" dirty="0"/>
           </a:p>
@@ -7293,8 +7464,8 @@
         </p:nvSpPr>
         <p:spPr>
           <a:xfrm>
-            <a:off x="762000" y="1396901"/>
-            <a:ext cx="7772400" cy="883593"/>
+            <a:off x="698450" y="1396901"/>
+            <a:ext cx="2720340" cy="1700213"/>
           </a:xfrm>
           <a:prstGeom prst="rect">
             <a:avLst/>
@@ -7308,12 +7479,12 @@
           <a:p>
             <a:pPr algn="l" indent="0" marL="0">
               <a:lnSpc>
-                <a:spcPts val="2320"/>
+                <a:spcPts val="1914"/>
               </a:lnSpc>
               <a:buNone/>
             </a:pPr>
             <a:r>
-              <a:rPr lang="en-US" sz="1600" dirty="0">
+              <a:rPr lang="en-US" sz="1450" dirty="0">
                 <a:solidFill>
                   <a:srgbClr val="433024"/>
                 </a:solidFill>
@@ -7321,9 +7492,9 @@
                 <a:ea typeface="Arial" pitchFamily="34" charset="-122"/>
                 <a:cs typeface="Arial" pitchFamily="34" charset="-120"/>
               </a:rPr>
-              <a:t>The notebook builds a four-layer LSTM stack (512 → 256 → 128 → 64 units) with batch normalisation and dropout after each layer, then reshapes a dense layer into four forecast days × three depths.</a:t>
-            </a:r>
-            <a:endParaRPr lang="en-US" sz="1600" dirty="0"/>
+              <a:t>The code builds the full architecture shown here: four LSTM layers (512 → 256 → 128 → 64 units) with batch norm and dropout after each, followed by a dense head reshaped to four forecast days × three depths.</a:t>
+            </a:r>
+            <a:endParaRPr lang="en-US" sz="1450" dirty="0"/>
           </a:p>
         </p:txBody>
       </p:sp>
@@ -7335,114 +7506,8 @@
         </p:nvSpPr>
         <p:spPr>
           <a:xfrm>
-            <a:off x="762000" y="2458194"/>
-            <a:ext cx="7620000" cy="1470571"/>
-          </a:xfrm>
-          <a:prstGeom prst="rect">
-            <a:avLst/>
-          </a:prstGeom>
-          <a:noFill/>
-          <a:ln/>
-        </p:spPr>
-        <p:txBody>
-          <a:bodyPr wrap="square" lIns="152400" tIns="0" rIns="0" bIns="0" rtlCol="0" anchor="t"/>
-          <a:lstStyle/>
-          <a:p>
-            <a:pPr algn="l" marL="152400" indent="-152400">
-              <a:lnSpc>
-                <a:spcPts val="1958"/>
-              </a:lnSpc>
-              <a:buSzPct val="100000"/>
-              <a:buChar char="•"/>
-            </a:pPr>
-            <a:r>
-              <a:rPr lang="en-US" sz="1450" dirty="0">
-                <a:solidFill>
-                  <a:srgbClr val="433024"/>
-                </a:solidFill>
-                <a:latin typeface="Arial" pitchFamily="34" charset="0"/>
-                <a:ea typeface="Arial" pitchFamily="34" charset="-122"/>
-                <a:cs typeface="Arial" pitchFamily="34" charset="-120"/>
-              </a:rPr>
-              <a:t>Optimizer: Adam starting at 0.001 with exponential decay after epoch 15.</a:t>
-            </a:r>
-            <a:endParaRPr lang="en-US" sz="1450" dirty="0"/>
-          </a:p>
-          <a:p>
-            <a:pPr algn="l" marL="152400" indent="-152400">
-              <a:lnSpc>
-                <a:spcPts val="1958"/>
-              </a:lnSpc>
-              <a:buSzPct val="100000"/>
-              <a:buChar char="•"/>
-            </a:pPr>
-            <a:r>
-              <a:rPr lang="en-US" sz="1450" dirty="0">
-                <a:solidFill>
-                  <a:srgbClr val="433024"/>
-                </a:solidFill>
-                <a:latin typeface="Arial" pitchFamily="34" charset="0"/>
-                <a:ea typeface="Arial" pitchFamily="34" charset="-122"/>
-                <a:cs typeface="Arial" pitchFamily="34" charset="-120"/>
-              </a:rPr>
-              <a:t>Loss: Mean Squared Error across the entire four-day horizon.</a:t>
-            </a:r>
-            <a:endParaRPr lang="en-US" sz="1450" dirty="0"/>
-          </a:p>
-          <a:p>
-            <a:pPr algn="l" marL="152400" indent="-152400">
-              <a:lnSpc>
-                <a:spcPts val="1958"/>
-              </a:lnSpc>
-              <a:buSzPct val="100000"/>
-              <a:buChar char="•"/>
-            </a:pPr>
-            <a:r>
-              <a:rPr lang="en-US" sz="1450" dirty="0">
-                <a:solidFill>
-                  <a:srgbClr val="433024"/>
-                </a:solidFill>
-                <a:latin typeface="Arial" pitchFamily="34" charset="0"/>
-                <a:ea typeface="Arial" pitchFamily="34" charset="-122"/>
-                <a:cs typeface="Arial" pitchFamily="34" charset="-120"/>
-              </a:rPr>
-              <a:t>TimeSeriesSplit (5 folds) keeps each plot’s chronology intact while sharing weights across plots.</a:t>
-            </a:r>
-            <a:endParaRPr lang="en-US" sz="1450" dirty="0"/>
-          </a:p>
-          <a:p>
-            <a:pPr algn="l" marL="152400" indent="-152400">
-              <a:lnSpc>
-                <a:spcPts val="1958"/>
-              </a:lnSpc>
-              <a:buSzPct val="100000"/>
-              <a:buChar char="•"/>
-            </a:pPr>
-            <a:r>
-              <a:rPr lang="en-US" sz="1450" dirty="0">
-                <a:solidFill>
-                  <a:srgbClr val="433024"/>
-                </a:solidFill>
-                <a:latin typeface="Arial" pitchFamily="34" charset="0"/>
-                <a:ea typeface="Arial" pitchFamily="34" charset="-122"/>
-                <a:cs typeface="Arial" pitchFamily="34" charset="-120"/>
-              </a:rPr>
-              <a:t>Batch size 128, patience 200 to let training settle without overfitting.</a:t>
-            </a:r>
-            <a:endParaRPr lang="en-US" sz="1450" dirty="0"/>
-          </a:p>
-        </p:txBody>
-      </p:sp>
-      <p:sp>
-        <p:nvSpPr>
-          <p:cNvPr id="6" name="Text 4"/>
-          <p:cNvSpPr/>
-          <p:nvPr/>
-        </p:nvSpPr>
-        <p:spPr>
-          <a:xfrm>
-            <a:off x="762000" y="4106466"/>
-            <a:ext cx="7772400" cy="496788"/>
+            <a:off x="698450" y="3211413"/>
+            <a:ext cx="2720340" cy="971550"/>
           </a:xfrm>
           <a:prstGeom prst="rect">
             <a:avLst/>
@@ -7456,7 +7521,7 @@
           <a:p>
             <a:pPr algn="l" indent="0" marL="0">
               <a:lnSpc>
-                <a:spcPts val="1958"/>
+                <a:spcPts val="1914"/>
               </a:lnSpc>
               <a:buNone/>
             </a:pPr>
@@ -7469,12 +7534,70 @@
                 <a:ea typeface="Arial" pitchFamily="34" charset="-122"/>
                 <a:cs typeface="Arial" pitchFamily="34" charset="-120"/>
               </a:rPr>
-              <a:t>Predictions are inverse-transformed with the stored MinMax scalers and means so evaluation happens in %VWC. If we see values pinning at 0 or 1 we can widen the 30% buffer.</a:t>
+              <a:t>Adam with exponential decay (start 0.001) and MSE loss run across five TimeSeriesSplit folds sharing weights across plots.</a:t>
             </a:r>
             <a:endParaRPr lang="en-US" sz="1450" dirty="0"/>
           </a:p>
         </p:txBody>
       </p:sp>
+      <p:sp>
+        <p:nvSpPr>
+          <p:cNvPr id="6" name="Text 4"/>
+          <p:cNvSpPr/>
+          <p:nvPr/>
+        </p:nvSpPr>
+        <p:spPr>
+          <a:xfrm>
+            <a:off x="3594050" y="1396901"/>
+            <a:ext cx="4914900" cy="2603599"/>
+          </a:xfrm>
+          <a:prstGeom prst="rect">
+            <a:avLst/>
+          </a:prstGeom>
+          <a:solidFill>
+            <a:srgbClr val="FFE7D1"/>
+          </a:solidFill>
+          <a:ln w="19050">
+            <a:solidFill>
+              <a:srgbClr val="C24B0A"/>
+            </a:solidFill>
+          </a:ln>
+        </p:spPr>
+        <p:txBody>
+          <a:bodyPr wrap="square" rtlCol="0" anchor="ctr"/>
+          <a:lstStyle/>
+          <a:p>
+            <a:pPr indent="0" marL="0">
+              <a:buNone/>
+            </a:pPr>
+            <a:endParaRPr lang="en-US" dirty="0"/>
+          </a:p>
+        </p:txBody>
+      </p:sp>
+      <p:pic>
+        <p:nvPicPr>
+          <p:cNvPr id="7" name="Image 0" descr="/home/bryan/presentation/slide-maker/workspace/images/final_visualizations/04_lstm_full_architecture_diagram.png">    </p:cNvPr>
+          <p:cNvPicPr>
+            <a:picLocks noChangeAspect="1"/>
+          </p:cNvPicPr>
+          <p:nvPr/>
+        </p:nvPicPr>
+        <p:blipFill>
+          <a:blip r:embed="rId1"/>
+          <a:stretch>
+            <a:fillRect/>
+          </a:stretch>
+        </p:blipFill>
+        <p:spPr>
+          <a:xfrm>
+            <a:off x="3765500" y="1963787"/>
+            <a:ext cx="4572000" cy="1469827"/>
+          </a:xfrm>
+          <a:prstGeom prst="rect">
+            <a:avLst/>
+          </a:prstGeom>
+        </p:spPr>
+      </p:pic>
     </p:spTree>
   </p:cSld>
   <p:clrMapOvr>
@@ -8856,7 +8979,7 @@
         <p:spPr>
           <a:xfrm>
             <a:off x="762000" y="1943100"/>
-            <a:ext cx="2590699" cy="1352550"/>
+            <a:ext cx="2590699" cy="1499890"/>
           </a:xfrm>
           <a:prstGeom prst="rect">
             <a:avLst/>
@@ -8870,12 +8993,12 @@
           <a:p>
             <a:pPr algn="l" indent="0" marL="0">
               <a:lnSpc>
-                <a:spcPts val="2100"/>
+                <a:spcPts val="1958"/>
               </a:lnSpc>
               <a:buNone/>
             </a:pPr>
             <a:r>
-              <a:rPr lang="en-US" sz="1500" dirty="0">
+              <a:rPr lang="en-US" sz="1450" dirty="0">
                 <a:solidFill>
                   <a:srgbClr val="433024"/>
                 </a:solidFill>
@@ -8883,16 +9006,16 @@
                 <a:ea typeface="Arial" pitchFamily="34" charset="-122"/>
                 <a:cs typeface="Arial" pitchFamily="34" charset="-120"/>
               </a:rPr>
-              <a:t>The notebook pulls these channels straight from </a:t>
+              <a:t>The notebook builds this list inside </a:t>
             </a:r>
             <a:pPr algn="l" indent="0" marL="0">
               <a:lnSpc>
-                <a:spcPts val="2100"/>
+                <a:spcPts val="1958"/>
               </a:lnSpc>
               <a:buNone/>
             </a:pPr>
             <a:r>
-              <a:rPr lang="en-US" sz="1500" dirty="0">
+              <a:rPr lang="en-US" sz="1450" dirty="0">
                 <a:solidFill>
                   <a:srgbClr val="433024"/>
                 </a:solidFill>
@@ -8904,12 +9027,12 @@
             </a:r>
             <a:pPr algn="l" indent="0" marL="0">
               <a:lnSpc>
-                <a:spcPts val="2100"/>
+                <a:spcPts val="1958"/>
               </a:lnSpc>
               <a:buNone/>
             </a:pPr>
             <a:r>
-              <a:rPr lang="en-US" sz="1500" dirty="0">
+              <a:rPr lang="en-US" sz="1450" dirty="0">
                 <a:solidFill>
                   <a:srgbClr val="433024"/>
                 </a:solidFill>
@@ -8917,9 +9040,9 @@
                 <a:ea typeface="Arial" pitchFamily="34" charset="-122"/>
                 <a:cs typeface="Arial" pitchFamily="34" charset="-120"/>
               </a:rPr>
-              <a:t> and passes them to every downstream transform.</a:t>
-            </a:r>
-            <a:endParaRPr lang="en-US" sz="1500" dirty="0"/>
+              <a:t>—weather, soil probes, and irrigation counters all land in the same dataframe.</a:t>
+            </a:r>
+            <a:endParaRPr lang="en-US" sz="1450" dirty="0"/>
           </a:p>
         </p:txBody>
       </p:sp>
@@ -8931,8 +9054,8 @@
         </p:nvSpPr>
         <p:spPr>
           <a:xfrm>
-            <a:off x="762000" y="3448050"/>
-            <a:ext cx="2590699" cy="1066800"/>
+            <a:off x="762000" y="3595390"/>
+            <a:ext cx="2590699" cy="993577"/>
           </a:xfrm>
           <a:prstGeom prst="rect">
             <a:avLst/>
@@ -8946,12 +9069,12 @@
           <a:p>
             <a:pPr algn="l" indent="0" marL="0">
               <a:lnSpc>
-                <a:spcPts val="2100"/>
+                <a:spcPts val="1958"/>
               </a:lnSpc>
               <a:buNone/>
             </a:pPr>
             <a:r>
-              <a:rPr lang="en-US" sz="1500" dirty="0">
+              <a:rPr lang="en-US" sz="1450" dirty="0">
                 <a:solidFill>
                   <a:srgbClr val="433024"/>
                 </a:solidFill>
@@ -8959,9 +9082,9 @@
                 <a:ea typeface="Arial" pitchFamily="34" charset="-122"/>
                 <a:cs typeface="Arial" pitchFamily="34" charset="-120"/>
               </a:rPr>
-              <a:t>If we ever disable a sensor, we edit the table and the code together to keep the data wrangling honest.</a:t>
-            </a:r>
-            <a:endParaRPr lang="en-US" sz="1500" dirty="0"/>
+              <a:t>If a sensor goes offline we update the code and this table together so downstream features never silently change.</a:t>
+            </a:r>
+            <a:endParaRPr lang="en-US" sz="1450" dirty="0"/>
           </a:p>
         </p:txBody>
       </p:sp>
@@ -9187,7 +9310,7 @@
         <p:spPr>
           <a:xfrm>
             <a:off x="762000" y="1943100"/>
-            <a:ext cx="2590699" cy="1490365"/>
+            <a:ext cx="2590699" cy="1738759"/>
           </a:xfrm>
           <a:prstGeom prst="rect">
             <a:avLst/>
@@ -9214,7 +9337,7 @@
                 <a:ea typeface="Arial" pitchFamily="34" charset="-122"/>
                 <a:cs typeface="Arial" pitchFamily="34" charset="-120"/>
               </a:rPr>
-              <a:t>The notebook adds spike flags, smoothed trends, derivatives, time-since-water counters, and log-scaled precipitation totals—exactly the columns listed here.</a:t>
+              <a:t>The notebook adds spike flags, smoothed trends, derivatives, time-since-water counters, log-scaled precipitation, and sinusoidal time encodings—exactly the columns listed here.</a:t>
             </a:r>
             <a:endParaRPr lang="en-US" sz="1450" dirty="0"/>
           </a:p>
@@ -9228,7 +9351,7 @@
         </p:nvSpPr>
         <p:spPr>
           <a:xfrm>
-            <a:off x="762000" y="3585865"/>
+            <a:off x="762000" y="3834259"/>
             <a:ext cx="2590699" cy="745182"/>
           </a:xfrm>
           <a:prstGeom prst="rect">
@@ -9256,7 +9379,7 @@
                 <a:ea typeface="Arial" pitchFamily="34" charset="-122"/>
                 <a:cs typeface="Arial" pitchFamily="34" charset="-120"/>
               </a:rPr>
-              <a:t>If a feature ever drops from this table, it has dropped from the code too.</a:t>
+              <a:t>If a feature isn’t in this table, it isn’t in the training dataframe; this is our drift checklist.</a:t>
             </a:r>
             <a:endParaRPr lang="en-US" sz="1450" dirty="0"/>
           </a:p>

</xml_diff>

<commit_message>
Replace tables with visuals and enlarge architecture diagram
</commit_message>
<xml_diff>
--- a/workspace/presentations/eda-lstm-vwc-prediction.pptx
+++ b/workspace/presentations/eda-lstm-vwc-prediction.pptx
@@ -7464,8 +7464,8 @@
         </p:nvSpPr>
         <p:spPr>
           <a:xfrm>
-            <a:off x="698450" y="1396901"/>
-            <a:ext cx="2720340" cy="1700213"/>
+            <a:off x="698450" y="1300907"/>
+            <a:ext cx="2720340" cy="1490365"/>
           </a:xfrm>
           <a:prstGeom prst="rect">
             <a:avLst/>
@@ -7479,7 +7479,7 @@
           <a:p>
             <a:pPr algn="l" indent="0" marL="0">
               <a:lnSpc>
-                <a:spcPts val="1914"/>
+                <a:spcPts val="1958"/>
               </a:lnSpc>
               <a:buNone/>
             </a:pPr>
@@ -7492,7 +7492,7 @@
                 <a:ea typeface="Arial" pitchFamily="34" charset="-122"/>
                 <a:cs typeface="Arial" pitchFamily="34" charset="-120"/>
               </a:rPr>
-              <a:t>The code builds the full architecture shown here: four LSTM layers (512 → 256 → 128 → 64 units) with batch norm and dropout after each, followed by a dense head reshaped to four forecast days × three depths.</a:t>
+              <a:t>The notebook builds the full stack below: LSTM layers with 512 → 256 → 128 → 64 units, batch norm, and dropout, then a dense head reshaped to four forecast days × three depths.</a:t>
             </a:r>
             <a:endParaRPr lang="en-US" sz="1450" dirty="0"/>
           </a:p>
@@ -7506,8 +7506,8 @@
         </p:nvSpPr>
         <p:spPr>
           <a:xfrm>
-            <a:off x="698450" y="3211413"/>
-            <a:ext cx="2720340" cy="971550"/>
+            <a:off x="698450" y="2918222"/>
+            <a:ext cx="2720340" cy="1241971"/>
           </a:xfrm>
           <a:prstGeom prst="rect">
             <a:avLst/>
@@ -7521,7 +7521,7 @@
           <a:p>
             <a:pPr algn="l" indent="0" marL="0">
               <a:lnSpc>
-                <a:spcPts val="1914"/>
+                <a:spcPts val="1958"/>
               </a:lnSpc>
               <a:buNone/>
             </a:pPr>
@@ -7534,7 +7534,7 @@
                 <a:ea typeface="Arial" pitchFamily="34" charset="-122"/>
                 <a:cs typeface="Arial" pitchFamily="34" charset="-120"/>
               </a:rPr>
-              <a:t>Adam with exponential decay (start 0.001) and MSE loss run across five TimeSeriesSplit folds sharing weights across plots.</a:t>
+              <a:t>Training uses Adam with exponential decay (start 0.001) and MSE loss across five TimeSeriesSplit folds so weights see every plot.</a:t>
             </a:r>
             <a:endParaRPr lang="en-US" sz="1450" dirty="0"/>
           </a:p>
@@ -7548,8 +7548,8 @@
         </p:nvSpPr>
         <p:spPr>
           <a:xfrm>
-            <a:off x="3594050" y="1396901"/>
-            <a:ext cx="4914900" cy="2603599"/>
+            <a:off x="3594050" y="1783259"/>
+            <a:ext cx="5168801" cy="1894284"/>
           </a:xfrm>
           <a:prstGeom prst="rect">
             <a:avLst/>
@@ -7590,8 +7590,8 @@
         </p:blipFill>
         <p:spPr>
           <a:xfrm>
-            <a:off x="3765500" y="1963787"/>
-            <a:ext cx="4572000" cy="1469827"/>
+            <a:off x="3765500" y="1954709"/>
+            <a:ext cx="4825901" cy="1551384"/>
           </a:xfrm>
           <a:prstGeom prst="rect">
             <a:avLst/>
@@ -8939,8 +8939,8 @@
         </p:nvSpPr>
         <p:spPr>
           <a:xfrm>
-            <a:off x="762000" y="1524000"/>
-            <a:ext cx="2590699" cy="266700"/>
+            <a:off x="698450" y="1322189"/>
+            <a:ext cx="2979319" cy="266700"/>
           </a:xfrm>
           <a:prstGeom prst="rect">
             <a:avLst/>
@@ -8978,8 +8978,8 @@
         </p:nvSpPr>
         <p:spPr>
           <a:xfrm>
-            <a:off x="762000" y="1943100"/>
-            <a:ext cx="2590699" cy="1499890"/>
+            <a:off x="698450" y="1741289"/>
+            <a:ext cx="2979319" cy="1251496"/>
           </a:xfrm>
           <a:prstGeom prst="rect">
             <a:avLst/>
@@ -9054,8 +9054,8 @@
         </p:nvSpPr>
         <p:spPr>
           <a:xfrm>
-            <a:off x="762000" y="3595390"/>
-            <a:ext cx="2590699" cy="993577"/>
+            <a:off x="698450" y="3145185"/>
+            <a:ext cx="2979319" cy="993577"/>
           </a:xfrm>
           <a:prstGeom prst="rect">
             <a:avLst/>
@@ -9096,8 +9096,8 @@
         </p:nvSpPr>
         <p:spPr>
           <a:xfrm>
-            <a:off x="3606701" y="1524000"/>
-            <a:ext cx="4388941" cy="2730550"/>
+            <a:off x="3898702" y="1098649"/>
+            <a:ext cx="5053905" cy="3263652"/>
           </a:xfrm>
           <a:prstGeom prst="rect">
             <a:avLst/>
@@ -9122,45 +9122,30 @@
           </a:p>
         </p:txBody>
       </p:sp>
-      <p:sp>
-        <p:nvSpPr>
-          <p:cNvPr id="8" name="Text 6"/>
-          <p:cNvSpPr/>
-          <p:nvPr/>
-        </p:nvSpPr>
-        <p:spPr>
-          <a:xfrm>
-            <a:off x="3778151" y="2784425"/>
-            <a:ext cx="4126962" cy="209550"/>
-          </a:xfrm>
-          <a:prstGeom prst="rect">
-            <a:avLst/>
-          </a:prstGeom>
-          <a:noFill/>
-          <a:ln/>
-        </p:spPr>
-        <p:txBody>
-          <a:bodyPr wrap="square" lIns="0" tIns="0" rIns="0" bIns="0" rtlCol="0" anchor="t"/>
-          <a:lstStyle/>
-          <a:p>
-            <a:pPr algn="l" indent="0" marL="0">
-              <a:buNone/>
-            </a:pPr>
-            <a:r>
-              <a:rPr lang="en-US" sz="1400" dirty="0">
-                <a:solidFill>
-                  <a:srgbClr val="7A3A14"/>
-                </a:solidFill>
-                <a:latin typeface="Arial" pitchFamily="34" charset="0"/>
-                <a:ea typeface="Arial" pitchFamily="34" charset="-122"/>
-                <a:cs typeface="Arial" pitchFamily="34" charset="-120"/>
-              </a:rPr>
-              <a:t>TABLE PLACEHOLDER — Native sensor channels</a:t>
-            </a:r>
-            <a:endParaRPr lang="en-US" sz="1400" dirty="0"/>
-          </a:p>
-        </p:txBody>
-      </p:sp>
+      <p:pic>
+        <p:nvPicPr>
+          <p:cNvPr id="8" name="Image 0" descr="/home/bryan/presentation/slide-maker/workspace/images/final_visualizations/01_native_sensor_channels_overview_table.png">    </p:cNvPr>
+          <p:cNvPicPr>
+            <a:picLocks noChangeAspect="1"/>
+          </p:cNvPicPr>
+          <p:nvPr/>
+        </p:nvPicPr>
+        <p:blipFill>
+          <a:blip r:embed="rId1"/>
+          <a:stretch>
+            <a:fillRect/>
+          </a:stretch>
+        </p:blipFill>
+        <p:spPr>
+          <a:xfrm>
+            <a:off x="4070152" y="1270099"/>
+            <a:ext cx="4711005" cy="2920752"/>
+          </a:xfrm>
+          <a:prstGeom prst="rect">
+            <a:avLst/>
+          </a:prstGeom>
+        </p:spPr>
+      </p:pic>
     </p:spTree>
   </p:cSld>
   <p:clrMapOvr>
@@ -9270,8 +9255,8 @@
         </p:nvSpPr>
         <p:spPr>
           <a:xfrm>
-            <a:off x="762000" y="1524000"/>
-            <a:ext cx="2590699" cy="266700"/>
+            <a:off x="698450" y="1326952"/>
+            <a:ext cx="2979319" cy="266700"/>
           </a:xfrm>
           <a:prstGeom prst="rect">
             <a:avLst/>
@@ -9309,8 +9294,8 @@
         </p:nvSpPr>
         <p:spPr>
           <a:xfrm>
-            <a:off x="762000" y="1943100"/>
-            <a:ext cx="2590699" cy="1738759"/>
+            <a:off x="698450" y="1746052"/>
+            <a:ext cx="2979319" cy="1490365"/>
           </a:xfrm>
           <a:prstGeom prst="rect">
             <a:avLst/>
@@ -9351,8 +9336,8 @@
         </p:nvSpPr>
         <p:spPr>
           <a:xfrm>
-            <a:off x="762000" y="3834259"/>
-            <a:ext cx="2590699" cy="745182"/>
+            <a:off x="698450" y="3388816"/>
+            <a:ext cx="2979319" cy="745182"/>
           </a:xfrm>
           <a:prstGeom prst="rect">
             <a:avLst/>
@@ -9379,7 +9364,7 @@
                 <a:ea typeface="Arial" pitchFamily="34" charset="-122"/>
                 <a:cs typeface="Arial" pitchFamily="34" charset="-120"/>
               </a:rPr>
-              <a:t>If a feature isn’t in this table, it isn’t in the training dataframe; this is our drift checklist.</a:t>
+              <a:t>If a feature isn’t in this table, it isn’t in the training dataframe; the graphic is our drift checklist.</a:t>
             </a:r>
             <a:endParaRPr lang="en-US" sz="1450" dirty="0"/>
           </a:p>
@@ -9393,8 +9378,8 @@
         </p:nvSpPr>
         <p:spPr>
           <a:xfrm>
-            <a:off x="3606701" y="1524000"/>
-            <a:ext cx="4339828" cy="2730550"/>
+            <a:off x="3898702" y="1098649"/>
+            <a:ext cx="4850457" cy="3263652"/>
           </a:xfrm>
           <a:prstGeom prst="rect">
             <a:avLst/>
@@ -9419,45 +9404,30 @@
           </a:p>
         </p:txBody>
       </p:sp>
-      <p:sp>
-        <p:nvSpPr>
-          <p:cNvPr id="8" name="Text 6"/>
-          <p:cNvSpPr/>
-          <p:nvPr/>
-        </p:nvSpPr>
-        <p:spPr>
-          <a:xfrm>
-            <a:off x="3778151" y="2784425"/>
-            <a:ext cx="4076867" cy="209550"/>
-          </a:xfrm>
-          <a:prstGeom prst="rect">
-            <a:avLst/>
-          </a:prstGeom>
-          <a:noFill/>
-          <a:ln/>
-        </p:spPr>
-        <p:txBody>
-          <a:bodyPr wrap="square" lIns="0" tIns="0" rIns="0" bIns="0" rtlCol="0" anchor="t"/>
-          <a:lstStyle/>
-          <a:p>
-            <a:pPr algn="l" indent="0" marL="0">
-              <a:buNone/>
-            </a:pPr>
-            <a:r>
-              <a:rPr lang="en-US" sz="1400" dirty="0">
-                <a:solidFill>
-                  <a:srgbClr val="7A3A14"/>
-                </a:solidFill>
-                <a:latin typeface="Arial" pitchFamily="34" charset="0"/>
-                <a:ea typeface="Arial" pitchFamily="34" charset="-122"/>
-                <a:cs typeface="Arial" pitchFamily="34" charset="-120"/>
-              </a:rPr>
-              <a:t>TABLE PLACEHOLDER — Engineered feature set</a:t>
-            </a:r>
-            <a:endParaRPr lang="en-US" sz="1400" dirty="0"/>
-          </a:p>
-        </p:txBody>
-      </p:sp>
+      <p:pic>
+        <p:nvPicPr>
+          <p:cNvPr id="8" name="Image 0" descr="/home/bryan/presentation/slide-maker/workspace/images/final_visualizations/02_engineered_features_overview_table.png">    </p:cNvPr>
+          <p:cNvPicPr>
+            <a:picLocks noChangeAspect="1"/>
+          </p:cNvPicPr>
+          <p:nvPr/>
+        </p:nvPicPr>
+        <p:blipFill>
+          <a:blip r:embed="rId1"/>
+          <a:stretch>
+            <a:fillRect/>
+          </a:stretch>
+        </p:blipFill>
+        <p:spPr>
+          <a:xfrm>
+            <a:off x="4070152" y="1270099"/>
+            <a:ext cx="4507557" cy="2920752"/>
+          </a:xfrm>
+          <a:prstGeom prst="rect">
+            <a:avLst/>
+          </a:prstGeom>
+        </p:spPr>
+      </p:pic>
     </p:spTree>
   </p:cSld>
   <p:clrMapOvr>

</xml_diff>